<commit_message>
klampt : update URDF and meshes
</commit_message>
<xml_diff>
--- a/joystick/doc/pygame-sysm@p table de correspondance.pptx
+++ b/joystick/doc/pygame-sysm@p table de correspondance.pptx
@@ -589,7 +589,7 @@
           <a:p>
             <a:fld id="{638941B0-F4D5-4460-BCAD-F7E2B41A8257}" type="datetimeFigureOut">
               <a:rPr lang="fr-FR" smtClean="0"/>
-              <a:t>05/10/2023</a:t>
+              <a:t>26/02/2024</a:t>
             </a:fld>
             <a:endParaRPr lang="fr-FR"/>
           </a:p>
@@ -631,7 +631,7 @@
           <a:p>
             <a:fld id="{27C6CCC6-2BE5-4E42-96A4-D1E8E81A3D8E}" type="slidenum">
               <a:rPr lang="fr-FR" smtClean="0"/>
-              <a:t>‹#›</a:t>
+              <a:t>‹N°›</a:t>
             </a:fld>
             <a:endParaRPr lang="fr-FR"/>
           </a:p>
@@ -757,7 +757,7 @@
           <a:p>
             <a:fld id="{638941B0-F4D5-4460-BCAD-F7E2B41A8257}" type="datetimeFigureOut">
               <a:rPr lang="fr-FR" smtClean="0"/>
-              <a:t>05/10/2023</a:t>
+              <a:t>26/02/2024</a:t>
             </a:fld>
             <a:endParaRPr lang="fr-FR"/>
           </a:p>
@@ -799,7 +799,7 @@
           <a:p>
             <a:fld id="{27C6CCC6-2BE5-4E42-96A4-D1E8E81A3D8E}" type="slidenum">
               <a:rPr lang="fr-FR" smtClean="0"/>
-              <a:t>‹#›</a:t>
+              <a:t>‹N°›</a:t>
             </a:fld>
             <a:endParaRPr lang="fr-FR"/>
           </a:p>
@@ -935,7 +935,7 @@
           <a:p>
             <a:fld id="{638941B0-F4D5-4460-BCAD-F7E2B41A8257}" type="datetimeFigureOut">
               <a:rPr lang="fr-FR" smtClean="0"/>
-              <a:t>05/10/2023</a:t>
+              <a:t>26/02/2024</a:t>
             </a:fld>
             <a:endParaRPr lang="fr-FR"/>
           </a:p>
@@ -977,7 +977,7 @@
           <a:p>
             <a:fld id="{27C6CCC6-2BE5-4E42-96A4-D1E8E81A3D8E}" type="slidenum">
               <a:rPr lang="fr-FR" smtClean="0"/>
-              <a:t>‹#›</a:t>
+              <a:t>‹N°›</a:t>
             </a:fld>
             <a:endParaRPr lang="fr-FR"/>
           </a:p>
@@ -1103,7 +1103,7 @@
           <a:p>
             <a:fld id="{638941B0-F4D5-4460-BCAD-F7E2B41A8257}" type="datetimeFigureOut">
               <a:rPr lang="fr-FR" smtClean="0"/>
-              <a:t>05/10/2023</a:t>
+              <a:t>26/02/2024</a:t>
             </a:fld>
             <a:endParaRPr lang="fr-FR"/>
           </a:p>
@@ -1145,7 +1145,7 @@
           <a:p>
             <a:fld id="{27C6CCC6-2BE5-4E42-96A4-D1E8E81A3D8E}" type="slidenum">
               <a:rPr lang="fr-FR" smtClean="0"/>
-              <a:t>‹#›</a:t>
+              <a:t>‹N°›</a:t>
             </a:fld>
             <a:endParaRPr lang="fr-FR"/>
           </a:p>
@@ -1348,7 +1348,7 @@
           <a:p>
             <a:fld id="{638941B0-F4D5-4460-BCAD-F7E2B41A8257}" type="datetimeFigureOut">
               <a:rPr lang="fr-FR" smtClean="0"/>
-              <a:t>05/10/2023</a:t>
+              <a:t>26/02/2024</a:t>
             </a:fld>
             <a:endParaRPr lang="fr-FR"/>
           </a:p>
@@ -1390,7 +1390,7 @@
           <a:p>
             <a:fld id="{27C6CCC6-2BE5-4E42-96A4-D1E8E81A3D8E}" type="slidenum">
               <a:rPr lang="fr-FR" smtClean="0"/>
-              <a:t>‹#›</a:t>
+              <a:t>‹N°›</a:t>
             </a:fld>
             <a:endParaRPr lang="fr-FR"/>
           </a:p>
@@ -1577,7 +1577,7 @@
           <a:p>
             <a:fld id="{638941B0-F4D5-4460-BCAD-F7E2B41A8257}" type="datetimeFigureOut">
               <a:rPr lang="fr-FR" smtClean="0"/>
-              <a:t>05/10/2023</a:t>
+              <a:t>26/02/2024</a:t>
             </a:fld>
             <a:endParaRPr lang="fr-FR"/>
           </a:p>
@@ -1619,7 +1619,7 @@
           <a:p>
             <a:fld id="{27C6CCC6-2BE5-4E42-96A4-D1E8E81A3D8E}" type="slidenum">
               <a:rPr lang="fr-FR" smtClean="0"/>
-              <a:t>‹#›</a:t>
+              <a:t>‹N°›</a:t>
             </a:fld>
             <a:endParaRPr lang="fr-FR"/>
           </a:p>
@@ -1941,7 +1941,7 @@
           <a:p>
             <a:fld id="{638941B0-F4D5-4460-BCAD-F7E2B41A8257}" type="datetimeFigureOut">
               <a:rPr lang="fr-FR" smtClean="0"/>
-              <a:t>05/10/2023</a:t>
+              <a:t>26/02/2024</a:t>
             </a:fld>
             <a:endParaRPr lang="fr-FR"/>
           </a:p>
@@ -1983,7 +1983,7 @@
           <a:p>
             <a:fld id="{27C6CCC6-2BE5-4E42-96A4-D1E8E81A3D8E}" type="slidenum">
               <a:rPr lang="fr-FR" smtClean="0"/>
-              <a:t>‹#›</a:t>
+              <a:t>‹N°›</a:t>
             </a:fld>
             <a:endParaRPr lang="fr-FR"/>
           </a:p>
@@ -2058,7 +2058,7 @@
           <a:p>
             <a:fld id="{638941B0-F4D5-4460-BCAD-F7E2B41A8257}" type="datetimeFigureOut">
               <a:rPr lang="fr-FR" smtClean="0"/>
-              <a:t>05/10/2023</a:t>
+              <a:t>26/02/2024</a:t>
             </a:fld>
             <a:endParaRPr lang="fr-FR"/>
           </a:p>
@@ -2100,7 +2100,7 @@
           <a:p>
             <a:fld id="{27C6CCC6-2BE5-4E42-96A4-D1E8E81A3D8E}" type="slidenum">
               <a:rPr lang="fr-FR" smtClean="0"/>
-              <a:t>‹#›</a:t>
+              <a:t>‹N°›</a:t>
             </a:fld>
             <a:endParaRPr lang="fr-FR"/>
           </a:p>
@@ -2153,7 +2153,7 @@
           <a:p>
             <a:fld id="{638941B0-F4D5-4460-BCAD-F7E2B41A8257}" type="datetimeFigureOut">
               <a:rPr lang="fr-FR" smtClean="0"/>
-              <a:t>05/10/2023</a:t>
+              <a:t>26/02/2024</a:t>
             </a:fld>
             <a:endParaRPr lang="fr-FR"/>
           </a:p>
@@ -2195,7 +2195,7 @@
           <a:p>
             <a:fld id="{27C6CCC6-2BE5-4E42-96A4-D1E8E81A3D8E}" type="slidenum">
               <a:rPr lang="fr-FR" smtClean="0"/>
-              <a:t>‹#›</a:t>
+              <a:t>‹N°›</a:t>
             </a:fld>
             <a:endParaRPr lang="fr-FR"/>
           </a:p>
@@ -2428,7 +2428,7 @@
           <a:p>
             <a:fld id="{638941B0-F4D5-4460-BCAD-F7E2B41A8257}" type="datetimeFigureOut">
               <a:rPr lang="fr-FR" smtClean="0"/>
-              <a:t>05/10/2023</a:t>
+              <a:t>26/02/2024</a:t>
             </a:fld>
             <a:endParaRPr lang="fr-FR"/>
           </a:p>
@@ -2470,7 +2470,7 @@
           <a:p>
             <a:fld id="{27C6CCC6-2BE5-4E42-96A4-D1E8E81A3D8E}" type="slidenum">
               <a:rPr lang="fr-FR" smtClean="0"/>
-              <a:t>‹#›</a:t>
+              <a:t>‹N°›</a:t>
             </a:fld>
             <a:endParaRPr lang="fr-FR"/>
           </a:p>
@@ -2680,7 +2680,7 @@
           <a:p>
             <a:fld id="{638941B0-F4D5-4460-BCAD-F7E2B41A8257}" type="datetimeFigureOut">
               <a:rPr lang="fr-FR" smtClean="0"/>
-              <a:t>05/10/2023</a:t>
+              <a:t>26/02/2024</a:t>
             </a:fld>
             <a:endParaRPr lang="fr-FR"/>
           </a:p>
@@ -2722,7 +2722,7 @@
           <a:p>
             <a:fld id="{27C6CCC6-2BE5-4E42-96A4-D1E8E81A3D8E}" type="slidenum">
               <a:rPr lang="fr-FR" smtClean="0"/>
-              <a:t>‹#›</a:t>
+              <a:t>‹N°›</a:t>
             </a:fld>
             <a:endParaRPr lang="fr-FR"/>
           </a:p>
@@ -2891,7 +2891,7 @@
           <a:p>
             <a:fld id="{638941B0-F4D5-4460-BCAD-F7E2B41A8257}" type="datetimeFigureOut">
               <a:rPr lang="fr-FR" smtClean="0"/>
-              <a:t>05/10/2023</a:t>
+              <a:t>26/02/2024</a:t>
             </a:fld>
             <a:endParaRPr lang="fr-FR"/>
           </a:p>
@@ -2969,7 +2969,7 @@
           <a:p>
             <a:fld id="{27C6CCC6-2BE5-4E42-96A4-D1E8E81A3D8E}" type="slidenum">
               <a:rPr lang="fr-FR" smtClean="0"/>
-              <a:t>‹#›</a:t>
+              <a:t>‹N°›</a:t>
             </a:fld>
             <a:endParaRPr lang="fr-FR"/>
           </a:p>
@@ -4281,14 +4281,14 @@
           <p:nvPr>
             <p:extLst>
               <p:ext uri="{D42A27DB-BD31-4B8C-83A1-F6EECF244321}">
-                <p14:modId xmlns:p14="http://schemas.microsoft.com/office/powerpoint/2010/main" val="365586389"/>
+                <p14:modId xmlns:p14="http://schemas.microsoft.com/office/powerpoint/2010/main" val="857459165"/>
               </p:ext>
             </p:extLst>
           </p:nvPr>
         </p:nvGraphicFramePr>
         <p:xfrm>
           <a:off x="342231" y="2180939"/>
-          <a:ext cx="5201538" cy="670560"/>
+          <a:ext cx="5201538" cy="731520"/>
         </p:xfrm>
         <a:graphic>
           <a:graphicData uri="http://schemas.openxmlformats.org/drawingml/2006/table">
@@ -4327,7 +4327,7 @@
                     <a:p>
                       <a:pPr algn="ctr"/>
                       <a:r>
-                        <a:rPr lang="fr-FR">
+                        <a:rPr lang="fr-FR" dirty="0">
                           <a:solidFill>
                             <a:schemeClr val="accent1"/>
                           </a:solidFill>
@@ -4335,14 +4335,22 @@
                         <a:t>Prélèvement 1 </a:t>
                       </a:r>
                       <a:r>
-                        <a:rPr lang="fr-FR" sz="2000">
+                        <a:rPr lang="fr-FR" b="1" dirty="0" err="1">
                           <a:solidFill>
                             <a:schemeClr val="tx1"/>
                           </a:solidFill>
                         </a:rPr>
+                        <a:t>hold-</a:t>
+                      </a:r>
+                      <a:r>
+                        <a:rPr lang="fr-FR" sz="2000" dirty="0" err="1">
+                          <a:solidFill>
+                            <a:schemeClr val="tx1"/>
+                          </a:solidFill>
+                        </a:rPr>
                         <a:t>P</a:t>
                       </a:r>
-                      <a:endParaRPr lang="fr-FR">
+                      <a:endParaRPr lang="fr-FR" dirty="0">
                         <a:solidFill>
                           <a:schemeClr val="tx1"/>
                         </a:solidFill>
@@ -4414,7 +4422,7 @@
                         <a:defRPr/>
                       </a:pPr>
                       <a:r>
-                        <a:rPr lang="fr-FR">
+                        <a:rPr lang="fr-FR" dirty="0">
                           <a:solidFill>
                             <a:schemeClr val="accent1"/>
                           </a:solidFill>
@@ -4422,14 +4430,22 @@
                         <a:t>Prélèvement 2 </a:t>
                       </a:r>
                       <a:r>
-                        <a:rPr lang="fr-FR" sz="2000">
+                        <a:rPr lang="fr-FR" sz="2000" b="1" dirty="0" err="1">
                           <a:solidFill>
                             <a:schemeClr val="tx1"/>
                           </a:solidFill>
                         </a:rPr>
+                        <a:t>hold-</a:t>
+                      </a:r>
+                      <a:r>
+                        <a:rPr lang="fr-FR" sz="2400" dirty="0" err="1">
+                          <a:solidFill>
+                            <a:schemeClr val="tx1"/>
+                          </a:solidFill>
+                        </a:rPr>
                         <a:t>P</a:t>
                       </a:r>
-                      <a:endParaRPr lang="fr-FR">
+                      <a:endParaRPr lang="fr-FR" dirty="0">
                         <a:solidFill>
                           <a:schemeClr val="tx1"/>
                         </a:solidFill>
@@ -4501,7 +4517,7 @@
                         <a:defRPr/>
                       </a:pPr>
                       <a:r>
-                        <a:rPr lang="fr-FR">
+                        <a:rPr lang="fr-FR" dirty="0">
                           <a:solidFill>
                             <a:schemeClr val="accent1"/>
                           </a:solidFill>
@@ -4509,14 +4525,22 @@
                         <a:t>Prélèvement 3 </a:t>
                       </a:r>
                       <a:r>
-                        <a:rPr lang="fr-FR" sz="2000">
+                        <a:rPr lang="fr-FR" sz="2000" b="1" dirty="0" err="1">
                           <a:solidFill>
                             <a:schemeClr val="tx1"/>
                           </a:solidFill>
                         </a:rPr>
+                        <a:t>hold-</a:t>
+                      </a:r>
+                      <a:r>
+                        <a:rPr lang="fr-FR" sz="2400" dirty="0" err="1">
+                          <a:solidFill>
+                            <a:schemeClr val="tx1"/>
+                          </a:solidFill>
+                        </a:rPr>
                         <a:t>P</a:t>
                       </a:r>
-                      <a:endParaRPr lang="fr-FR">
+                      <a:endParaRPr lang="fr-FR" dirty="0">
                         <a:solidFill>
                           <a:schemeClr val="tx1"/>
                         </a:solidFill>
@@ -4899,14 +4923,14 @@
           <p:nvPr>
             <p:extLst>
               <p:ext uri="{D42A27DB-BD31-4B8C-83A1-F6EECF244321}">
-                <p14:modId xmlns:p14="http://schemas.microsoft.com/office/powerpoint/2010/main" val="1642136090"/>
+                <p14:modId xmlns:p14="http://schemas.microsoft.com/office/powerpoint/2010/main" val="4270450120"/>
               </p:ext>
             </p:extLst>
           </p:nvPr>
         </p:nvGraphicFramePr>
         <p:xfrm>
           <a:off x="6096000" y="2180939"/>
-          <a:ext cx="5741322" cy="670560"/>
+          <a:ext cx="5741322" cy="731520"/>
         </p:xfrm>
         <a:graphic>
           <a:graphicData uri="http://schemas.openxmlformats.org/drawingml/2006/table">
@@ -4945,7 +4969,7 @@
                     <a:p>
                       <a:pPr algn="ctr"/>
                       <a:r>
-                        <a:rPr lang="fr-FR">
+                        <a:rPr lang="fr-FR" dirty="0">
                           <a:solidFill>
                             <a:schemeClr val="accent1"/>
                           </a:solidFill>
@@ -4953,14 +4977,22 @@
                         <a:t>Macro-stockage 3 </a:t>
                       </a:r>
                       <a:r>
-                        <a:rPr lang="fr-FR" sz="2000">
+                        <a:rPr lang="fr-FR" sz="2000" b="1" dirty="0" err="1">
                           <a:solidFill>
                             <a:schemeClr val="tx1"/>
                           </a:solidFill>
                         </a:rPr>
+                        <a:t>hold-</a:t>
+                      </a:r>
+                      <a:r>
+                        <a:rPr lang="fr-FR" sz="2400" dirty="0" err="1">
+                          <a:solidFill>
+                            <a:schemeClr val="tx1"/>
+                          </a:solidFill>
+                        </a:rPr>
                         <a:t>P</a:t>
                       </a:r>
-                      <a:endParaRPr lang="fr-FR">
+                      <a:endParaRPr lang="fr-FR" dirty="0">
                         <a:solidFill>
                           <a:schemeClr val="tx1"/>
                         </a:solidFill>
@@ -5032,7 +5064,7 @@
                         <a:defRPr/>
                       </a:pPr>
                       <a:r>
-                        <a:rPr lang="fr-FR">
+                        <a:rPr lang="fr-FR" dirty="0">
                           <a:solidFill>
                             <a:schemeClr val="accent1"/>
                           </a:solidFill>
@@ -5040,14 +5072,22 @@
                         <a:t>Macro-stockage 2 </a:t>
                       </a:r>
                       <a:r>
-                        <a:rPr lang="fr-FR" sz="2000">
+                        <a:rPr lang="fr-FR" sz="2000" b="1" dirty="0" err="1">
                           <a:solidFill>
                             <a:schemeClr val="tx1"/>
                           </a:solidFill>
                         </a:rPr>
+                        <a:t>hold-</a:t>
+                      </a:r>
+                      <a:r>
+                        <a:rPr lang="fr-FR" sz="2400" dirty="0" err="1">
+                          <a:solidFill>
+                            <a:schemeClr val="tx1"/>
+                          </a:solidFill>
+                        </a:rPr>
                         <a:t>P</a:t>
                       </a:r>
-                      <a:endParaRPr lang="fr-FR">
+                      <a:endParaRPr lang="fr-FR" dirty="0">
                         <a:solidFill>
                           <a:schemeClr val="tx1"/>
                         </a:solidFill>
@@ -5119,7 +5159,7 @@
                         <a:defRPr/>
                       </a:pPr>
                       <a:r>
-                        <a:rPr lang="fr-FR">
+                        <a:rPr lang="fr-FR" dirty="0">
                           <a:solidFill>
                             <a:schemeClr val="accent1"/>
                           </a:solidFill>
@@ -5127,14 +5167,22 @@
                         <a:t>Macro-stockage 1 </a:t>
                       </a:r>
                       <a:r>
-                        <a:rPr lang="fr-FR" sz="2000">
+                        <a:rPr lang="fr-FR" sz="2000" b="1" dirty="0" err="1">
                           <a:solidFill>
                             <a:schemeClr val="tx1"/>
                           </a:solidFill>
                         </a:rPr>
+                        <a:t>hold-</a:t>
+                      </a:r>
+                      <a:r>
+                        <a:rPr lang="fr-FR" sz="2400" dirty="0" err="1">
+                          <a:solidFill>
+                            <a:schemeClr val="tx1"/>
+                          </a:solidFill>
+                        </a:rPr>
                         <a:t>P</a:t>
                       </a:r>
-                      <a:endParaRPr lang="fr-FR">
+                      <a:endParaRPr lang="fr-FR" dirty="0">
                         <a:solidFill>
                           <a:schemeClr val="tx1"/>
                         </a:solidFill>
@@ -5208,7 +5256,7 @@
           <p:nvPr>
             <p:extLst>
               <p:ext uri="{D42A27DB-BD31-4B8C-83A1-F6EECF244321}">
-                <p14:modId xmlns:p14="http://schemas.microsoft.com/office/powerpoint/2010/main" val="305129260"/>
+                <p14:modId xmlns:p14="http://schemas.microsoft.com/office/powerpoint/2010/main" val="4075882103"/>
               </p:ext>
             </p:extLst>
           </p:nvPr>
@@ -5341,7 +5389,7 @@
                         <a:defRPr/>
                       </a:pPr>
                       <a:r>
-                        <a:rPr lang="fr-FR">
+                        <a:rPr lang="fr-FR" dirty="0">
                           <a:solidFill>
                             <a:schemeClr val="accent1"/>
                           </a:solidFill>
@@ -5349,14 +5397,14 @@
                         <a:t>Macro-position zéro </a:t>
                       </a:r>
                       <a:r>
-                        <a:rPr lang="fr-FR" sz="2000">
+                        <a:rPr lang="fr-FR" sz="2000" dirty="0">
                           <a:solidFill>
                             <a:schemeClr val="tx1"/>
                           </a:solidFill>
                         </a:rPr>
-                        <a:t>P</a:t>
-                      </a:r>
-                      <a:endParaRPr lang="fr-FR">
+                        <a:t>S</a:t>
+                      </a:r>
+                      <a:endParaRPr lang="fr-FR" dirty="0">
                         <a:solidFill>
                           <a:schemeClr val="tx1"/>
                         </a:solidFill>
@@ -5428,7 +5476,7 @@
                         <a:defRPr/>
                       </a:pPr>
                       <a:r>
-                        <a:rPr lang="fr-FR">
+                        <a:rPr lang="fr-FR" dirty="0">
                           <a:solidFill>
                             <a:schemeClr val="accent1"/>
                           </a:solidFill>
@@ -5436,14 +5484,14 @@
                         <a:t>Macro frotti/poussière </a:t>
                       </a:r>
                       <a:r>
-                        <a:rPr lang="fr-FR" sz="2000">
+                        <a:rPr lang="fr-FR" sz="2000" dirty="0">
                           <a:solidFill>
                             <a:schemeClr val="tx1"/>
                           </a:solidFill>
                         </a:rPr>
                         <a:t>P</a:t>
                       </a:r>
-                      <a:endParaRPr lang="fr-FR">
+                      <a:endParaRPr lang="fr-FR" dirty="0">
                         <a:solidFill>
                           <a:schemeClr val="tx1"/>
                         </a:solidFill>
@@ -5686,14 +5734,14 @@
           <p:nvPr>
             <p:extLst>
               <p:ext uri="{D42A27DB-BD31-4B8C-83A1-F6EECF244321}">
-                <p14:modId xmlns:p14="http://schemas.microsoft.com/office/powerpoint/2010/main" val="630513062"/>
+                <p14:modId xmlns:p14="http://schemas.microsoft.com/office/powerpoint/2010/main" val="2989801105"/>
               </p:ext>
             </p:extLst>
           </p:nvPr>
         </p:nvGraphicFramePr>
         <p:xfrm>
           <a:off x="6365890" y="2180939"/>
-          <a:ext cx="5201538" cy="670560"/>
+          <a:ext cx="5201538" cy="731520"/>
         </p:xfrm>
         <a:graphic>
           <a:graphicData uri="http://schemas.openxmlformats.org/drawingml/2006/table">
@@ -5732,7 +5780,7 @@
                     <a:p>
                       <a:pPr algn="ctr"/>
                       <a:r>
-                        <a:rPr lang="fr-FR">
+                        <a:rPr lang="fr-FR" dirty="0">
                           <a:solidFill>
                             <a:schemeClr val="accent1"/>
                           </a:solidFill>
@@ -5740,14 +5788,22 @@
                         <a:t>Prélèvement 3 </a:t>
                       </a:r>
                       <a:r>
-                        <a:rPr lang="fr-FR" sz="2000">
+                        <a:rPr lang="fr-FR" sz="2000" b="1" dirty="0" err="1">
                           <a:solidFill>
                             <a:schemeClr val="tx1"/>
                           </a:solidFill>
                         </a:rPr>
+                        <a:t>hold-</a:t>
+                      </a:r>
+                      <a:r>
+                        <a:rPr lang="fr-FR" sz="2400" dirty="0" err="1">
+                          <a:solidFill>
+                            <a:schemeClr val="tx1"/>
+                          </a:solidFill>
+                        </a:rPr>
                         <a:t>P</a:t>
                       </a:r>
-                      <a:endParaRPr lang="fr-FR">
+                      <a:endParaRPr lang="fr-FR" dirty="0">
                         <a:solidFill>
                           <a:schemeClr val="tx1"/>
                         </a:solidFill>
@@ -5819,7 +5875,7 @@
                         <a:defRPr/>
                       </a:pPr>
                       <a:r>
-                        <a:rPr lang="fr-FR">
+                        <a:rPr lang="fr-FR" dirty="0">
                           <a:solidFill>
                             <a:schemeClr val="accent1"/>
                           </a:solidFill>
@@ -5827,14 +5883,22 @@
                         <a:t>Prélèvement 2 </a:t>
                       </a:r>
                       <a:r>
-                        <a:rPr lang="fr-FR" sz="2000">
+                        <a:rPr lang="fr-FR" sz="2000" b="1" dirty="0" err="1">
                           <a:solidFill>
                             <a:schemeClr val="tx1"/>
                           </a:solidFill>
                         </a:rPr>
+                        <a:t>hold-</a:t>
+                      </a:r>
+                      <a:r>
+                        <a:rPr lang="fr-FR" sz="2400" dirty="0" err="1">
+                          <a:solidFill>
+                            <a:schemeClr val="tx1"/>
+                          </a:solidFill>
+                        </a:rPr>
                         <a:t>P</a:t>
                       </a:r>
-                      <a:endParaRPr lang="fr-FR">
+                      <a:endParaRPr lang="fr-FR" dirty="0">
                         <a:solidFill>
                           <a:schemeClr val="tx1"/>
                         </a:solidFill>
@@ -5906,7 +5970,7 @@
                         <a:defRPr/>
                       </a:pPr>
                       <a:r>
-                        <a:rPr lang="fr-FR">
+                        <a:rPr lang="fr-FR" dirty="0">
                           <a:solidFill>
                             <a:schemeClr val="accent1"/>
                           </a:solidFill>
@@ -5914,14 +5978,22 @@
                         <a:t>Prélèvement 1 </a:t>
                       </a:r>
                       <a:r>
-                        <a:rPr lang="fr-FR" sz="2000">
+                        <a:rPr lang="fr-FR" sz="2000" b="1" dirty="0" err="1">
                           <a:solidFill>
                             <a:schemeClr val="tx1"/>
                           </a:solidFill>
                         </a:rPr>
+                        <a:t>hold-</a:t>
+                      </a:r>
+                      <a:r>
+                        <a:rPr lang="fr-FR" sz="2400" dirty="0" err="1">
+                          <a:solidFill>
+                            <a:schemeClr val="tx1"/>
+                          </a:solidFill>
+                        </a:rPr>
                         <a:t>P</a:t>
                       </a:r>
-                      <a:endParaRPr lang="fr-FR">
+                      <a:endParaRPr lang="fr-FR" dirty="0">
                         <a:solidFill>
                           <a:schemeClr val="tx1"/>
                         </a:solidFill>
@@ -6304,14 +6376,14 @@
           <p:nvPr>
             <p:extLst>
               <p:ext uri="{D42A27DB-BD31-4B8C-83A1-F6EECF244321}">
-                <p14:modId xmlns:p14="http://schemas.microsoft.com/office/powerpoint/2010/main" val="2925994339"/>
+                <p14:modId xmlns:p14="http://schemas.microsoft.com/office/powerpoint/2010/main" val="875881811"/>
               </p:ext>
             </p:extLst>
           </p:nvPr>
         </p:nvGraphicFramePr>
         <p:xfrm>
           <a:off x="354678" y="2180939"/>
-          <a:ext cx="5741322" cy="670560"/>
+          <a:ext cx="5741322" cy="731520"/>
         </p:xfrm>
         <a:graphic>
           <a:graphicData uri="http://schemas.openxmlformats.org/drawingml/2006/table">
@@ -6350,7 +6422,7 @@
                     <a:p>
                       <a:pPr algn="ctr"/>
                       <a:r>
-                        <a:rPr lang="fr-FR">
+                        <a:rPr lang="fr-FR" dirty="0">
                           <a:solidFill>
                             <a:schemeClr val="accent1"/>
                           </a:solidFill>
@@ -6358,14 +6430,22 @@
                         <a:t>Macro-stockage 1 </a:t>
                       </a:r>
                       <a:r>
-                        <a:rPr lang="fr-FR" sz="2000">
+                        <a:rPr lang="fr-FR" sz="2000" b="1" dirty="0" err="1">
                           <a:solidFill>
                             <a:schemeClr val="tx1"/>
                           </a:solidFill>
                         </a:rPr>
+                        <a:t>hold-</a:t>
+                      </a:r>
+                      <a:r>
+                        <a:rPr lang="fr-FR" sz="2400" dirty="0" err="1">
+                          <a:solidFill>
+                            <a:schemeClr val="tx1"/>
+                          </a:solidFill>
+                        </a:rPr>
                         <a:t>P</a:t>
                       </a:r>
-                      <a:endParaRPr lang="fr-FR">
+                      <a:endParaRPr lang="fr-FR" dirty="0">
                         <a:solidFill>
                           <a:schemeClr val="tx1"/>
                         </a:solidFill>
@@ -6437,7 +6517,7 @@
                         <a:defRPr/>
                       </a:pPr>
                       <a:r>
-                        <a:rPr lang="fr-FR">
+                        <a:rPr lang="fr-FR" dirty="0">
                           <a:solidFill>
                             <a:schemeClr val="accent1"/>
                           </a:solidFill>
@@ -6445,14 +6525,22 @@
                         <a:t>Macro-stockage 2 </a:t>
                       </a:r>
                       <a:r>
-                        <a:rPr lang="fr-FR" sz="2000">
+                        <a:rPr lang="fr-FR" sz="2000" b="1" dirty="0" err="1">
                           <a:solidFill>
                             <a:schemeClr val="tx1"/>
                           </a:solidFill>
                         </a:rPr>
+                        <a:t>hold-</a:t>
+                      </a:r>
+                      <a:r>
+                        <a:rPr lang="fr-FR" sz="2400" dirty="0" err="1">
+                          <a:solidFill>
+                            <a:schemeClr val="tx1"/>
+                          </a:solidFill>
+                        </a:rPr>
                         <a:t>P</a:t>
                       </a:r>
-                      <a:endParaRPr lang="fr-FR">
+                      <a:endParaRPr lang="fr-FR" dirty="0">
                         <a:solidFill>
                           <a:schemeClr val="tx1"/>
                         </a:solidFill>
@@ -6524,7 +6612,7 @@
                         <a:defRPr/>
                       </a:pPr>
                       <a:r>
-                        <a:rPr lang="fr-FR">
+                        <a:rPr lang="fr-FR" dirty="0">
                           <a:solidFill>
                             <a:schemeClr val="accent1"/>
                           </a:solidFill>
@@ -6532,14 +6620,22 @@
                         <a:t>Macro-stockage 3 </a:t>
                       </a:r>
                       <a:r>
-                        <a:rPr lang="fr-FR" sz="2000">
+                        <a:rPr lang="fr-FR" sz="2000" b="1" dirty="0" err="1">
                           <a:solidFill>
                             <a:schemeClr val="tx1"/>
                           </a:solidFill>
                         </a:rPr>
+                        <a:t>hold-</a:t>
+                      </a:r>
+                      <a:r>
+                        <a:rPr lang="fr-FR" sz="2400" dirty="0" err="1">
+                          <a:solidFill>
+                            <a:schemeClr val="tx1"/>
+                          </a:solidFill>
+                        </a:rPr>
                         <a:t>P</a:t>
                       </a:r>
-                      <a:endParaRPr lang="fr-FR">
+                      <a:endParaRPr lang="fr-FR" dirty="0">
                         <a:solidFill>
                           <a:schemeClr val="tx1"/>
                         </a:solidFill>
@@ -6613,7 +6709,7 @@
           <p:nvPr>
             <p:extLst>
               <p:ext uri="{D42A27DB-BD31-4B8C-83A1-F6EECF244321}">
-                <p14:modId xmlns:p14="http://schemas.microsoft.com/office/powerpoint/2010/main" val="3749672892"/>
+                <p14:modId xmlns:p14="http://schemas.microsoft.com/office/powerpoint/2010/main" val="3165454523"/>
               </p:ext>
             </p:extLst>
           </p:nvPr>
@@ -6759,7 +6855,7 @@
                             <a:schemeClr val="tx1"/>
                           </a:solidFill>
                         </a:rPr>
-                        <a:t>P</a:t>
+                        <a:t>S</a:t>
                       </a:r>
                       <a:endParaRPr lang="fr-FR">
                         <a:solidFill>
@@ -6833,7 +6929,7 @@
                         <a:defRPr/>
                       </a:pPr>
                       <a:r>
-                        <a:rPr lang="fr-FR">
+                        <a:rPr lang="fr-FR" dirty="0">
                           <a:solidFill>
                             <a:schemeClr val="accent1"/>
                           </a:solidFill>
@@ -6841,14 +6937,14 @@
                         <a:t>Macro-repliement </a:t>
                       </a:r>
                       <a:r>
-                        <a:rPr lang="fr-FR" sz="2000">
+                        <a:rPr lang="fr-FR" sz="2000" dirty="0">
                           <a:solidFill>
                             <a:schemeClr val="tx1"/>
                           </a:solidFill>
                         </a:rPr>
                         <a:t>P</a:t>
                       </a:r>
-                      <a:endParaRPr lang="fr-FR">
+                      <a:endParaRPr lang="fr-FR" dirty="0">
                         <a:solidFill>
                           <a:schemeClr val="tx1"/>
                         </a:solidFill>

</xml_diff>